<commit_message>
slides for second unit
</commit_message>
<xml_diff>
--- a/unit_1_introduction.pptx
+++ b/unit_1_introduction.pptx
@@ -8,12 +8,13 @@
     <p:sldId id="256" r:id="rId2"/>
     <p:sldId id="257" r:id="rId3"/>
     <p:sldId id="258" r:id="rId4"/>
-    <p:sldId id="259" r:id="rId5"/>
-    <p:sldId id="260" r:id="rId6"/>
-    <p:sldId id="261" r:id="rId7"/>
-    <p:sldId id="262" r:id="rId8"/>
-    <p:sldId id="264" r:id="rId9"/>
-    <p:sldId id="263" r:id="rId10"/>
+    <p:sldId id="265" r:id="rId5"/>
+    <p:sldId id="259" r:id="rId6"/>
+    <p:sldId id="260" r:id="rId7"/>
+    <p:sldId id="261" r:id="rId8"/>
+    <p:sldId id="262" r:id="rId9"/>
+    <p:sldId id="264" r:id="rId10"/>
+    <p:sldId id="266" r:id="rId11"/>
   </p:sldIdLst>
   <p:sldSz cx="12192000" cy="6858000"/>
   <p:notesSz cx="6858000" cy="9144000"/>
@@ -5426,6 +5427,109 @@
 </p:sld>
 </file>
 
+<file path=ppt/slides/slide10.xml><?xml version="1.0" encoding="utf-8"?>
+<p:sld xmlns:a="http://schemas.openxmlformats.org/drawingml/2006/main" xmlns:r="http://schemas.openxmlformats.org/officeDocument/2006/relationships" xmlns:p="http://schemas.openxmlformats.org/presentationml/2006/main">
+  <p:cSld>
+    <p:spTree>
+      <p:nvGrpSpPr>
+        <p:cNvPr id="1" name=""/>
+        <p:cNvGrpSpPr/>
+        <p:nvPr/>
+      </p:nvGrpSpPr>
+      <p:grpSpPr>
+        <a:xfrm>
+          <a:off x="0" y="0"/>
+          <a:ext cx="0" cy="0"/>
+          <a:chOff x="0" y="0"/>
+          <a:chExt cx="0" cy="0"/>
+        </a:xfrm>
+      </p:grpSpPr>
+      <p:sp>
+        <p:nvSpPr>
+          <p:cNvPr id="2" name="Titel 1">
+            <a:extLst>
+              <a:ext uri="{FF2B5EF4-FFF2-40B4-BE49-F238E27FC236}">
+                <a16:creationId xmlns:a16="http://schemas.microsoft.com/office/drawing/2014/main" id="{123BD27B-3A65-8155-CCD9-F9D3B880677C}"/>
+              </a:ext>
+            </a:extLst>
+          </p:cNvPr>
+          <p:cNvSpPr>
+            <a:spLocks noGrp="1"/>
+          </p:cNvSpPr>
+          <p:nvPr>
+            <p:ph type="title"/>
+          </p:nvPr>
+        </p:nvSpPr>
+        <p:spPr/>
+        <p:txBody>
+          <a:bodyPr/>
+          <a:lstStyle/>
+          <a:p>
+            <a:r>
+              <a:rPr lang="de-DE" dirty="0"/>
+              <a:t>Python </a:t>
+            </a:r>
+            <a:r>
+              <a:rPr lang="de-DE" dirty="0" err="1"/>
+              <a:t>Doctumentation</a:t>
+            </a:r>
+            <a:endParaRPr lang="de-DE" dirty="0"/>
+          </a:p>
+        </p:txBody>
+      </p:sp>
+      <p:sp>
+        <p:nvSpPr>
+          <p:cNvPr id="3" name="Inhaltsplatzhalter 2">
+            <a:extLst>
+              <a:ext uri="{FF2B5EF4-FFF2-40B4-BE49-F238E27FC236}">
+                <a16:creationId xmlns:a16="http://schemas.microsoft.com/office/drawing/2014/main" id="{7E13FC1E-80AE-1297-8923-32848F952346}"/>
+              </a:ext>
+            </a:extLst>
+          </p:cNvPr>
+          <p:cNvSpPr>
+            <a:spLocks noGrp="1"/>
+          </p:cNvSpPr>
+          <p:nvPr>
+            <p:ph idx="1"/>
+          </p:nvPr>
+        </p:nvSpPr>
+        <p:spPr/>
+        <p:txBody>
+          <a:bodyPr/>
+          <a:lstStyle/>
+          <a:p>
+            <a:r>
+              <a:rPr lang="de-DE" dirty="0">
+                <a:hlinkClick r:id="rId2"/>
+              </a:rPr>
+              <a:t>https://docs.python.org/3/tutorial/interpreter.html</a:t>
+            </a:r>
+            <a:endParaRPr lang="de-DE" dirty="0"/>
+          </a:p>
+          <a:p>
+            <a:r>
+              <a:rPr lang="de-DE" dirty="0">
+                <a:hlinkClick r:id="rId3"/>
+              </a:rPr>
+              <a:t>https://docs.python.org/3/tutorial/introduction.html</a:t>
+            </a:r>
+            <a:endParaRPr lang="de-DE" dirty="0"/>
+          </a:p>
+        </p:txBody>
+      </p:sp>
+    </p:spTree>
+    <p:extLst>
+      <p:ext uri="{BB962C8B-B14F-4D97-AF65-F5344CB8AC3E}">
+        <p14:creationId xmlns:p14="http://schemas.microsoft.com/office/powerpoint/2010/main" val="2770925150"/>
+      </p:ext>
+    </p:extLst>
+  </p:cSld>
+  <p:clrMapOvr>
+    <a:masterClrMapping/>
+  </p:clrMapOvr>
+</p:sld>
+</file>
+
 <file path=ppt/slides/slide2.xml><?xml version="1.0" encoding="utf-8"?>
 <p:sld xmlns:a="http://schemas.openxmlformats.org/drawingml/2006/main" xmlns:r="http://schemas.openxmlformats.org/officeDocument/2006/relationships" xmlns:p="http://schemas.openxmlformats.org/presentationml/2006/main">
   <p:cSld>
@@ -5611,137 +5715,74 @@
         </p:nvSpPr>
         <p:spPr/>
         <p:txBody>
-          <a:bodyPr/>
+          <a:bodyPr>
+            <a:normAutofit/>
+          </a:bodyPr>
           <a:lstStyle/>
           <a:p>
-            <a:r>
-              <a:rPr lang="de-DE" dirty="0" err="1"/>
-              <a:t>widely</a:t>
-            </a:r>
-            <a:r>
-              <a:rPr lang="de-DE" dirty="0"/>
+            <a:pPr>
+              <a:buSzPct val="120000"/>
+              <a:buFont typeface="+mj-lt"/>
+              <a:buAutoNum type="arabicPeriod"/>
+            </a:pPr>
+            <a:r>
+              <a:rPr lang="de-DE" sz="2400" dirty="0"/>
+              <a:t> General </a:t>
+            </a:r>
+            <a:r>
+              <a:rPr lang="de-DE" sz="2400" dirty="0" err="1"/>
+              <a:t>information</a:t>
+            </a:r>
+            <a:endParaRPr lang="de-DE" sz="2400" dirty="0"/>
+          </a:p>
+          <a:p>
+            <a:pPr>
+              <a:buSzPct val="120000"/>
+              <a:buFont typeface="+mj-lt"/>
+              <a:buAutoNum type="arabicPeriod"/>
+            </a:pPr>
+            <a:r>
+              <a:rPr lang="de-DE" sz="2400" dirty="0"/>
               <a:t> </a:t>
             </a:r>
             <a:r>
-              <a:rPr lang="de-DE" dirty="0" err="1"/>
-              <a:t>used</a:t>
-            </a:r>
-            <a:r>
-              <a:rPr lang="de-DE" dirty="0"/>
-              <a:t> in:</a:t>
-            </a:r>
-          </a:p>
-          <a:p>
-            <a:pPr lvl="1"/>
-            <a:r>
-              <a:rPr lang="de-DE" dirty="0"/>
-              <a:t>web </a:t>
-            </a:r>
-            <a:r>
-              <a:rPr lang="de-DE" dirty="0" err="1"/>
-              <a:t>developement</a:t>
-            </a:r>
-            <a:endParaRPr lang="de-DE" dirty="0"/>
-          </a:p>
-          <a:p>
-            <a:pPr lvl="1"/>
-            <a:r>
-              <a:rPr lang="de-DE" dirty="0" err="1"/>
-              <a:t>DataScience</a:t>
-            </a:r>
-            <a:endParaRPr lang="de-DE" dirty="0"/>
-          </a:p>
-          <a:p>
-            <a:pPr lvl="1"/>
-            <a:r>
-              <a:rPr lang="de-DE" dirty="0" err="1"/>
-              <a:t>MachineLearning</a:t>
-            </a:r>
-            <a:endParaRPr lang="de-DE" dirty="0"/>
-          </a:p>
-          <a:p>
-            <a:r>
-              <a:rPr lang="de-DE" dirty="0"/>
-              <a:t>Scripting Language</a:t>
-            </a:r>
-          </a:p>
-          <a:p>
-            <a:pPr lvl="1"/>
-            <a:r>
-              <a:rPr lang="de-DE" dirty="0"/>
-              <a:t>Interpreter</a:t>
-            </a:r>
-          </a:p>
-          <a:p>
-            <a:pPr lvl="1"/>
-            <a:r>
-              <a:rPr lang="de-DE" dirty="0" err="1"/>
-              <a:t>slower</a:t>
-            </a:r>
-            <a:endParaRPr lang="de-DE" dirty="0"/>
-          </a:p>
-          <a:p>
-            <a:pPr lvl="1"/>
-            <a:r>
-              <a:rPr lang="de-DE" dirty="0" err="1"/>
-              <a:t>dynamically</a:t>
-            </a:r>
-            <a:r>
-              <a:rPr lang="de-DE" dirty="0"/>
-              <a:t> </a:t>
-            </a:r>
-            <a:r>
-              <a:rPr lang="de-DE" dirty="0" err="1"/>
-              <a:t>typed</a:t>
-            </a:r>
-            <a:endParaRPr lang="de-DE" dirty="0"/>
-          </a:p>
-          <a:p>
-            <a:r>
-              <a:rPr lang="de-DE" dirty="0" err="1"/>
-              <a:t>reduced</a:t>
-            </a:r>
-            <a:r>
-              <a:rPr lang="de-DE" dirty="0"/>
-              <a:t> Syntax – </a:t>
-            </a:r>
-            <a:r>
-              <a:rPr lang="de-DE" dirty="0" err="1"/>
-              <a:t>close</a:t>
-            </a:r>
-            <a:r>
-              <a:rPr lang="de-DE" dirty="0"/>
-              <a:t> </a:t>
-            </a:r>
-            <a:r>
-              <a:rPr lang="de-DE" dirty="0" err="1"/>
-              <a:t>to</a:t>
-            </a:r>
-            <a:r>
-              <a:rPr lang="de-DE" dirty="0"/>
-              <a:t> </a:t>
-            </a:r>
-            <a:r>
-              <a:rPr lang="de-DE" dirty="0" err="1"/>
-              <a:t>the</a:t>
-            </a:r>
-            <a:r>
-              <a:rPr lang="de-DE" dirty="0"/>
-              <a:t> </a:t>
-            </a:r>
-            <a:r>
-              <a:rPr lang="de-DE" dirty="0" err="1"/>
-              <a:t>english</a:t>
-            </a:r>
-            <a:r>
-              <a:rPr lang="de-DE" dirty="0"/>
-              <a:t> </a:t>
-            </a:r>
-            <a:r>
-              <a:rPr lang="de-DE" dirty="0" err="1"/>
-              <a:t>language</a:t>
-            </a:r>
-            <a:endParaRPr lang="de-DE" dirty="0"/>
+              <a:rPr lang="de-DE" sz="2400" dirty="0" err="1"/>
+              <a:t>Why</a:t>
+            </a:r>
+            <a:r>
+              <a:rPr lang="de-DE" sz="2400" dirty="0"/>
+              <a:t> Python</a:t>
+            </a:r>
+          </a:p>
+          <a:p>
+            <a:pPr>
+              <a:buSzPct val="120000"/>
+              <a:buFont typeface="+mj-lt"/>
+              <a:buAutoNum type="arabicPeriod"/>
+            </a:pPr>
+            <a:r>
+              <a:rPr lang="de-DE" sz="2400" dirty="0"/>
+              <a:t> Installation</a:t>
+            </a:r>
+          </a:p>
+          <a:p>
+            <a:pPr>
+              <a:buSzPct val="120000"/>
+              <a:buFont typeface="+mj-lt"/>
+              <a:buAutoNum type="arabicPeriod"/>
+            </a:pPr>
+            <a:r>
+              <a:rPr lang="de-DE" sz="2400" dirty="0"/>
+              <a:t> Working </a:t>
+            </a:r>
+            <a:r>
+              <a:rPr lang="de-DE" sz="2400" dirty="0" err="1"/>
+              <a:t>with</a:t>
+            </a:r>
+            <a:r>
+              <a:rPr lang="de-DE" sz="2400" dirty="0"/>
+              <a:t> Python</a:t>
+            </a:r>
           </a:p>
         </p:txBody>
       </p:sp>
@@ -5780,7 +5821,7 @@
           <p:cNvPr id="2" name="Titel 1">
             <a:extLst>
               <a:ext uri="{FF2B5EF4-FFF2-40B4-BE49-F238E27FC236}">
-                <a16:creationId xmlns:a16="http://schemas.microsoft.com/office/drawing/2014/main" id="{37013F38-49B3-B64F-632D-E033068EFBA5}"/>
+                <a16:creationId xmlns:a16="http://schemas.microsoft.com/office/drawing/2014/main" id="{9EA6E234-47AC-E6C1-DD79-C4E388F51F0F}"/>
               </a:ext>
             </a:extLst>
           </p:cNvPr>
@@ -5798,21 +5839,26 @@
           <a:p>
             <a:r>
               <a:rPr lang="de-DE" dirty="0" err="1"/>
-              <a:t>Why</a:t>
+              <a:t>general</a:t>
             </a:r>
             <a:r>
               <a:rPr lang="de-DE" dirty="0"/>
-              <a:t> Python?</a:t>
-            </a:r>
-          </a:p>
-        </p:txBody>
-      </p:sp>
-      <p:sp>
-        <p:nvSpPr>
-          <p:cNvPr id="3" name="Inhaltsplatzhalter 2">
+              <a:t> </a:t>
+            </a:r>
+            <a:r>
+              <a:rPr lang="de-DE" dirty="0" err="1"/>
+              <a:t>information</a:t>
+            </a:r>
+            <a:endParaRPr lang="de-DE" dirty="0"/>
+          </a:p>
+        </p:txBody>
+      </p:sp>
+      <p:sp>
+        <p:nvSpPr>
+          <p:cNvPr id="4" name="Inhaltsplatzhalter 2">
             <a:extLst>
               <a:ext uri="{FF2B5EF4-FFF2-40B4-BE49-F238E27FC236}">
-                <a16:creationId xmlns:a16="http://schemas.microsoft.com/office/drawing/2014/main" id="{7D92193C-9563-53C9-4C28-4925906086DD}"/>
+                <a16:creationId xmlns:a16="http://schemas.microsoft.com/office/drawing/2014/main" id="{6FB38D90-2499-74C3-A5A1-78D9316C7716}"/>
               </a:ext>
             </a:extLst>
           </p:cNvPr>
@@ -5830,23 +5876,7 @@
           <a:p>
             <a:r>
               <a:rPr lang="de-DE" dirty="0" err="1"/>
-              <a:t>directly</a:t>
-            </a:r>
-            <a:r>
-              <a:rPr lang="de-DE" dirty="0"/>
-              <a:t>, </a:t>
-            </a:r>
-            <a:r>
-              <a:rPr lang="de-DE" dirty="0" err="1"/>
-              <a:t>uncomplicated</a:t>
-            </a:r>
-            <a:endParaRPr lang="de-DE" dirty="0"/>
-          </a:p>
-          <a:p>
-            <a:pPr lvl="1"/>
-            <a:r>
-              <a:rPr lang="de-DE" dirty="0" err="1"/>
-              <a:t>perfect</a:t>
+              <a:t>widely</a:t>
             </a:r>
             <a:r>
               <a:rPr lang="de-DE" dirty="0"/>
@@ -5854,22 +5884,67 @@
             </a:r>
             <a:r>
               <a:rPr lang="de-DE" dirty="0" err="1"/>
-              <a:t>for</a:t>
+              <a:t>used</a:t>
             </a:r>
             <a:r>
               <a:rPr lang="de-DE" dirty="0"/>
-              <a:t> fast </a:t>
+              <a:t> in:</a:t>
+            </a:r>
+          </a:p>
+          <a:p>
+            <a:pPr lvl="1"/>
+            <a:r>
+              <a:rPr lang="de-DE" dirty="0"/>
+              <a:t>web </a:t>
             </a:r>
             <a:r>
               <a:rPr lang="de-DE" dirty="0" err="1"/>
-              <a:t>Prototyping</a:t>
+              <a:t>developement</a:t>
             </a:r>
             <a:endParaRPr lang="de-DE" dirty="0"/>
           </a:p>
           <a:p>
+            <a:pPr lvl="1"/>
             <a:r>
               <a:rPr lang="de-DE" dirty="0" err="1"/>
-              <a:t>beginner</a:t>
+              <a:t>DataScience</a:t>
+            </a:r>
+            <a:endParaRPr lang="de-DE" dirty="0"/>
+          </a:p>
+          <a:p>
+            <a:pPr lvl="1"/>
+            <a:r>
+              <a:rPr lang="de-DE" dirty="0" err="1"/>
+              <a:t>MachineLearning</a:t>
+            </a:r>
+            <a:endParaRPr lang="de-DE" dirty="0"/>
+          </a:p>
+          <a:p>
+            <a:r>
+              <a:rPr lang="de-DE" dirty="0"/>
+              <a:t>Scripting Language</a:t>
+            </a:r>
+          </a:p>
+          <a:p>
+            <a:pPr lvl="1"/>
+            <a:r>
+              <a:rPr lang="de-DE" dirty="0"/>
+              <a:t>Interpreter</a:t>
+            </a:r>
+          </a:p>
+          <a:p>
+            <a:pPr lvl="1"/>
+            <a:r>
+              <a:rPr lang="de-DE" dirty="0" err="1"/>
+              <a:t>slower</a:t>
+            </a:r>
+            <a:endParaRPr lang="de-DE" dirty="0"/>
+          </a:p>
+          <a:p>
+            <a:pPr lvl="1"/>
+            <a:r>
+              <a:rPr lang="de-DE" dirty="0" err="1"/>
+              <a:t>dynamically</a:t>
             </a:r>
             <a:r>
               <a:rPr lang="de-DE" dirty="0"/>
@@ -5877,18 +5952,27 @@
             </a:r>
             <a:r>
               <a:rPr lang="de-DE" dirty="0" err="1"/>
-              <a:t>friendliy</a:t>
+              <a:t>typed</a:t>
+            </a:r>
+            <a:endParaRPr lang="de-DE" dirty="0"/>
+          </a:p>
+          <a:p>
+            <a:r>
+              <a:rPr lang="de-DE" dirty="0" err="1"/>
+              <a:t>reduced</a:t>
+            </a:r>
+            <a:r>
+              <a:rPr lang="de-DE" dirty="0"/>
+              <a:t> Syntax – </a:t>
+            </a:r>
+            <a:r>
+              <a:rPr lang="de-DE" dirty="0" err="1"/>
+              <a:t>close</a:t>
             </a:r>
             <a:r>
               <a:rPr lang="de-DE" dirty="0"/>
               <a:t> </a:t>
             </a:r>
-          </a:p>
-          <a:p>
-            <a:r>
-              <a:rPr lang="de-DE" dirty="0"/>
-              <a:t>easy </a:t>
-            </a:r>
             <a:r>
               <a:rPr lang="de-DE" dirty="0" err="1"/>
               <a:t>to</a:t>
@@ -5899,22 +5983,32 @@
             </a:r>
             <a:r>
               <a:rPr lang="de-DE" dirty="0" err="1"/>
-              <a:t>learn</a:t>
+              <a:t>the</a:t>
+            </a:r>
+            <a:r>
+              <a:rPr lang="de-DE" dirty="0"/>
+              <a:t> </a:t>
+            </a:r>
+            <a:r>
+              <a:rPr lang="de-DE" dirty="0" err="1"/>
+              <a:t>english</a:t>
+            </a:r>
+            <a:r>
+              <a:rPr lang="de-DE" dirty="0"/>
+              <a:t> </a:t>
+            </a:r>
+            <a:r>
+              <a:rPr lang="de-DE" dirty="0" err="1"/>
+              <a:t>language</a:t>
             </a:r>
             <a:endParaRPr lang="de-DE" dirty="0"/>
-          </a:p>
-          <a:p>
-            <a:r>
-              <a:rPr lang="de-DE" dirty="0"/>
-              <a:t>easy but powerful</a:t>
-            </a:r>
           </a:p>
         </p:txBody>
       </p:sp>
     </p:spTree>
     <p:extLst>
       <p:ext uri="{BB962C8B-B14F-4D97-AF65-F5344CB8AC3E}">
-        <p14:creationId xmlns:p14="http://schemas.microsoft.com/office/powerpoint/2010/main" val="3173809548"/>
+        <p14:creationId xmlns:p14="http://schemas.microsoft.com/office/powerpoint/2010/main" val="1473716785"/>
       </p:ext>
     </p:extLst>
   </p:cSld>
@@ -5946,6 +6040,172 @@
           <p:cNvPr id="2" name="Titel 1">
             <a:extLst>
               <a:ext uri="{FF2B5EF4-FFF2-40B4-BE49-F238E27FC236}">
+                <a16:creationId xmlns:a16="http://schemas.microsoft.com/office/drawing/2014/main" id="{37013F38-49B3-B64F-632D-E033068EFBA5}"/>
+              </a:ext>
+            </a:extLst>
+          </p:cNvPr>
+          <p:cNvSpPr>
+            <a:spLocks noGrp="1"/>
+          </p:cNvSpPr>
+          <p:nvPr>
+            <p:ph type="title"/>
+          </p:nvPr>
+        </p:nvSpPr>
+        <p:spPr/>
+        <p:txBody>
+          <a:bodyPr/>
+          <a:lstStyle/>
+          <a:p>
+            <a:r>
+              <a:rPr lang="de-DE" dirty="0" err="1"/>
+              <a:t>Why</a:t>
+            </a:r>
+            <a:r>
+              <a:rPr lang="de-DE" dirty="0"/>
+              <a:t> Python?</a:t>
+            </a:r>
+          </a:p>
+        </p:txBody>
+      </p:sp>
+      <p:sp>
+        <p:nvSpPr>
+          <p:cNvPr id="3" name="Inhaltsplatzhalter 2">
+            <a:extLst>
+              <a:ext uri="{FF2B5EF4-FFF2-40B4-BE49-F238E27FC236}">
+                <a16:creationId xmlns:a16="http://schemas.microsoft.com/office/drawing/2014/main" id="{7D92193C-9563-53C9-4C28-4925906086DD}"/>
+              </a:ext>
+            </a:extLst>
+          </p:cNvPr>
+          <p:cNvSpPr>
+            <a:spLocks noGrp="1"/>
+          </p:cNvSpPr>
+          <p:nvPr>
+            <p:ph idx="1"/>
+          </p:nvPr>
+        </p:nvSpPr>
+        <p:spPr/>
+        <p:txBody>
+          <a:bodyPr/>
+          <a:lstStyle/>
+          <a:p>
+            <a:r>
+              <a:rPr lang="de-DE" dirty="0" err="1"/>
+              <a:t>directly</a:t>
+            </a:r>
+            <a:r>
+              <a:rPr lang="de-DE" dirty="0"/>
+              <a:t>, </a:t>
+            </a:r>
+            <a:r>
+              <a:rPr lang="de-DE" dirty="0" err="1"/>
+              <a:t>uncomplicated</a:t>
+            </a:r>
+            <a:endParaRPr lang="de-DE" dirty="0"/>
+          </a:p>
+          <a:p>
+            <a:pPr lvl="1"/>
+            <a:r>
+              <a:rPr lang="de-DE" dirty="0" err="1"/>
+              <a:t>perfect</a:t>
+            </a:r>
+            <a:r>
+              <a:rPr lang="de-DE" dirty="0"/>
+              <a:t> </a:t>
+            </a:r>
+            <a:r>
+              <a:rPr lang="de-DE" dirty="0" err="1"/>
+              <a:t>for</a:t>
+            </a:r>
+            <a:r>
+              <a:rPr lang="de-DE" dirty="0"/>
+              <a:t> fast </a:t>
+            </a:r>
+            <a:r>
+              <a:rPr lang="de-DE" dirty="0" err="1"/>
+              <a:t>Prototyping</a:t>
+            </a:r>
+            <a:endParaRPr lang="de-DE" dirty="0"/>
+          </a:p>
+          <a:p>
+            <a:r>
+              <a:rPr lang="de-DE" dirty="0" err="1"/>
+              <a:t>beginner</a:t>
+            </a:r>
+            <a:r>
+              <a:rPr lang="de-DE" dirty="0"/>
+              <a:t> </a:t>
+            </a:r>
+            <a:r>
+              <a:rPr lang="de-DE" dirty="0" err="1"/>
+              <a:t>friendliy</a:t>
+            </a:r>
+            <a:r>
+              <a:rPr lang="de-DE" dirty="0"/>
+              <a:t> </a:t>
+            </a:r>
+          </a:p>
+          <a:p>
+            <a:r>
+              <a:rPr lang="de-DE" dirty="0"/>
+              <a:t>easy </a:t>
+            </a:r>
+            <a:r>
+              <a:rPr lang="de-DE" dirty="0" err="1"/>
+              <a:t>to</a:t>
+            </a:r>
+            <a:r>
+              <a:rPr lang="de-DE" dirty="0"/>
+              <a:t> </a:t>
+            </a:r>
+            <a:r>
+              <a:rPr lang="de-DE" dirty="0" err="1"/>
+              <a:t>learn</a:t>
+            </a:r>
+            <a:endParaRPr lang="de-DE" dirty="0"/>
+          </a:p>
+          <a:p>
+            <a:r>
+              <a:rPr lang="de-DE" dirty="0"/>
+              <a:t>easy but powerful</a:t>
+            </a:r>
+          </a:p>
+        </p:txBody>
+      </p:sp>
+    </p:spTree>
+    <p:extLst>
+      <p:ext uri="{BB962C8B-B14F-4D97-AF65-F5344CB8AC3E}">
+        <p14:creationId xmlns:p14="http://schemas.microsoft.com/office/powerpoint/2010/main" val="3173809548"/>
+      </p:ext>
+    </p:extLst>
+  </p:cSld>
+  <p:clrMapOvr>
+    <a:masterClrMapping/>
+  </p:clrMapOvr>
+</p:sld>
+</file>
+
+<file path=ppt/slides/slide6.xml><?xml version="1.0" encoding="utf-8"?>
+<p:sld xmlns:a="http://schemas.openxmlformats.org/drawingml/2006/main" xmlns:r="http://schemas.openxmlformats.org/officeDocument/2006/relationships" xmlns:p="http://schemas.openxmlformats.org/presentationml/2006/main">
+  <p:cSld>
+    <p:spTree>
+      <p:nvGrpSpPr>
+        <p:cNvPr id="1" name=""/>
+        <p:cNvGrpSpPr/>
+        <p:nvPr/>
+      </p:nvGrpSpPr>
+      <p:grpSpPr>
+        <a:xfrm>
+          <a:off x="0" y="0"/>
+          <a:ext cx="0" cy="0"/>
+          <a:chOff x="0" y="0"/>
+          <a:chExt cx="0" cy="0"/>
+        </a:xfrm>
+      </p:grpSpPr>
+      <p:sp>
+        <p:nvSpPr>
+          <p:cNvPr id="2" name="Titel 1">
+            <a:extLst>
+              <a:ext uri="{FF2B5EF4-FFF2-40B4-BE49-F238E27FC236}">
                 <a16:creationId xmlns:a16="http://schemas.microsoft.com/office/drawing/2014/main" id="{67D97649-0A4E-66FB-6C4D-F39E10B7B430}"/>
               </a:ext>
             </a:extLst>
@@ -6007,7 +6267,7 @@
 </p:sld>
 </file>
 
-<file path=ppt/slides/slide6.xml><?xml version="1.0" encoding="utf-8"?>
+<file path=ppt/slides/slide7.xml><?xml version="1.0" encoding="utf-8"?>
 <p:sld xmlns:a="http://schemas.openxmlformats.org/drawingml/2006/main" xmlns:r="http://schemas.openxmlformats.org/officeDocument/2006/relationships" xmlns:p="http://schemas.openxmlformats.org/presentationml/2006/main">
   <p:cSld>
     <p:spTree>
@@ -6533,7 +6793,7 @@
 </p:sld>
 </file>
 
-<file path=ppt/slides/slide7.xml><?xml version="1.0" encoding="utf-8"?>
+<file path=ppt/slides/slide8.xml><?xml version="1.0" encoding="utf-8"?>
 <p:sld xmlns:a="http://schemas.openxmlformats.org/drawingml/2006/main" xmlns:r="http://schemas.openxmlformats.org/officeDocument/2006/relationships" xmlns:p="http://schemas.openxmlformats.org/presentationml/2006/main">
   <p:cSld>
     <p:spTree>
@@ -7409,7 +7669,7 @@
 </p:sld>
 </file>
 
-<file path=ppt/slides/slide8.xml><?xml version="1.0" encoding="utf-8"?>
+<file path=ppt/slides/slide9.xml><?xml version="1.0" encoding="utf-8"?>
 <p:sld xmlns:a="http://schemas.openxmlformats.org/drawingml/2006/main" xmlns:r="http://schemas.openxmlformats.org/officeDocument/2006/relationships" xmlns:p="http://schemas.openxmlformats.org/presentationml/2006/main">
   <p:cSld>
     <p:spTree>
@@ -8155,86 +8415,6 @@
 </p:sld>
 </file>
 
-<file path=ppt/slides/slide9.xml><?xml version="1.0" encoding="utf-8"?>
-<p:sld xmlns:a="http://schemas.openxmlformats.org/drawingml/2006/main" xmlns:r="http://schemas.openxmlformats.org/officeDocument/2006/relationships" xmlns:p="http://schemas.openxmlformats.org/presentationml/2006/main">
-  <p:cSld>
-    <p:spTree>
-      <p:nvGrpSpPr>
-        <p:cNvPr id="1" name=""/>
-        <p:cNvGrpSpPr/>
-        <p:nvPr/>
-      </p:nvGrpSpPr>
-      <p:grpSpPr>
-        <a:xfrm>
-          <a:off x="0" y="0"/>
-          <a:ext cx="0" cy="0"/>
-          <a:chOff x="0" y="0"/>
-          <a:chExt cx="0" cy="0"/>
-        </a:xfrm>
-      </p:grpSpPr>
-      <p:sp>
-        <p:nvSpPr>
-          <p:cNvPr id="2" name="Titel 1">
-            <a:extLst>
-              <a:ext uri="{FF2B5EF4-FFF2-40B4-BE49-F238E27FC236}">
-                <a16:creationId xmlns:a16="http://schemas.microsoft.com/office/drawing/2014/main" id="{B0F23E1D-53B0-6D53-7661-FECEF5A2BEBB}"/>
-              </a:ext>
-            </a:extLst>
-          </p:cNvPr>
-          <p:cNvSpPr>
-            <a:spLocks noGrp="1"/>
-          </p:cNvSpPr>
-          <p:nvPr>
-            <p:ph type="title"/>
-          </p:nvPr>
-        </p:nvSpPr>
-        <p:spPr/>
-        <p:txBody>
-          <a:bodyPr/>
-          <a:lstStyle/>
-          <a:p>
-            <a:endParaRPr lang="de-DE"/>
-          </a:p>
-        </p:txBody>
-      </p:sp>
-      <p:sp>
-        <p:nvSpPr>
-          <p:cNvPr id="3" name="Inhaltsplatzhalter 2">
-            <a:extLst>
-              <a:ext uri="{FF2B5EF4-FFF2-40B4-BE49-F238E27FC236}">
-                <a16:creationId xmlns:a16="http://schemas.microsoft.com/office/drawing/2014/main" id="{EA534C3E-D199-E90B-55AC-B20C54C6B845}"/>
-              </a:ext>
-            </a:extLst>
-          </p:cNvPr>
-          <p:cNvSpPr>
-            <a:spLocks noGrp="1"/>
-          </p:cNvSpPr>
-          <p:nvPr>
-            <p:ph idx="1"/>
-          </p:nvPr>
-        </p:nvSpPr>
-        <p:spPr/>
-        <p:txBody>
-          <a:bodyPr/>
-          <a:lstStyle/>
-          <a:p>
-            <a:endParaRPr lang="de-DE"/>
-          </a:p>
-        </p:txBody>
-      </p:sp>
-    </p:spTree>
-    <p:extLst>
-      <p:ext uri="{BB962C8B-B14F-4D97-AF65-F5344CB8AC3E}">
-        <p14:creationId xmlns:p14="http://schemas.microsoft.com/office/powerpoint/2010/main" val="725663286"/>
-      </p:ext>
-    </p:extLst>
-  </p:cSld>
-  <p:clrMapOvr>
-    <a:masterClrMapping/>
-  </p:clrMapOvr>
-</p:sld>
-</file>
-
 <file path=ppt/theme/theme1.xml><?xml version="1.0" encoding="utf-8"?>
 <a:theme xmlns:a="http://schemas.openxmlformats.org/drawingml/2006/main" name="Zitierfähig">
   <a:themeElements>

</xml_diff>